<commit_message>
Added User Authentication step to Angularjs tutorial
</commit_message>
<xml_diff>
--- a/angularjs.pptx
+++ b/angularjs.pptx
@@ -5,7 +5,7 @@
     <p:sldMasterId id="2147483648" r:id="rId1"/>
   </p:sldMasterIdLst>
   <p:notesMasterIdLst>
-    <p:notesMasterId r:id="rId20"/>
+    <p:notesMasterId r:id="rId21"/>
   </p:notesMasterIdLst>
   <p:sldIdLst>
     <p:sldId id="256" r:id="rId2"/>
@@ -26,6 +26,7 @@
     <p:sldId id="272" r:id="rId17"/>
     <p:sldId id="273" r:id="rId18"/>
     <p:sldId id="271" r:id="rId19"/>
+    <p:sldId id="275" r:id="rId20"/>
   </p:sldIdLst>
   <p:sldSz cx="9144000" cy="6858000" type="screen4x3"/>
   <p:notesSz cx="6858000" cy="9144000"/>
@@ -209,7 +210,8 @@
           <a:p>
             <a:fld id="{421615F4-BD7F-4BFC-B847-14E062149410}" type="datetimeFigureOut">
               <a:rPr lang="en-US" smtClean="0"/>
-              <a:t>3/17/2014</a:t>
+              <a:pPr/>
+              <a:t>3/18/2014</a:t>
             </a:fld>
             <a:endParaRPr lang="en-US"/>
           </a:p>
@@ -370,6 +372,7 @@
           <a:p>
             <a:fld id="{CA667F5A-5D8E-4E78-8D3B-0D05BC55CF96}" type="slidenum">
               <a:rPr lang="en-US" smtClean="0"/>
+              <a:pPr/>
               <a:t>‹#›</a:t>
             </a:fld>
             <a:endParaRPr lang="en-US"/>
@@ -541,6 +544,7 @@
           <a:p>
             <a:fld id="{CA667F5A-5D8E-4E78-8D3B-0D05BC55CF96}" type="slidenum">
               <a:rPr lang="en-US" smtClean="0"/>
+              <a:pPr/>
               <a:t>11</a:t>
             </a:fld>
             <a:endParaRPr lang="en-US"/>
@@ -622,6 +626,7 @@
           <a:p>
             <a:fld id="{CA667F5A-5D8E-4E78-8D3B-0D05BC55CF96}" type="slidenum">
               <a:rPr lang="en-US" smtClean="0"/>
+              <a:pPr/>
               <a:t>12</a:t>
             </a:fld>
             <a:endParaRPr lang="en-US"/>
@@ -703,6 +708,7 @@
           <a:p>
             <a:fld id="{CA667F5A-5D8E-4E78-8D3B-0D05BC55CF96}" type="slidenum">
               <a:rPr lang="en-US" smtClean="0"/>
+              <a:pPr/>
               <a:t>13</a:t>
             </a:fld>
             <a:endParaRPr lang="en-US"/>
@@ -898,7 +904,8 @@
           <a:p>
             <a:fld id="{AF36A4A4-BB8A-44E0-883B-9481513997F2}" type="datetimeFigureOut">
               <a:rPr lang="en-US" smtClean="0"/>
-              <a:t>3/17/2014</a:t>
+              <a:pPr/>
+              <a:t>3/18/2014</a:t>
             </a:fld>
             <a:endParaRPr lang="en-US"/>
           </a:p>
@@ -940,6 +947,7 @@
           <a:p>
             <a:fld id="{1529C7C7-3459-47EB-A020-C8C67DC67743}" type="slidenum">
               <a:rPr lang="en-US" smtClean="0"/>
+              <a:pPr/>
               <a:t>‹#›</a:t>
             </a:fld>
             <a:endParaRPr lang="en-US"/>
@@ -1063,7 +1071,8 @@
           <a:p>
             <a:fld id="{AF36A4A4-BB8A-44E0-883B-9481513997F2}" type="datetimeFigureOut">
               <a:rPr lang="en-US" smtClean="0"/>
-              <a:t>3/17/2014</a:t>
+              <a:pPr/>
+              <a:t>3/18/2014</a:t>
             </a:fld>
             <a:endParaRPr lang="en-US"/>
           </a:p>
@@ -1105,6 +1114,7 @@
           <a:p>
             <a:fld id="{1529C7C7-3459-47EB-A020-C8C67DC67743}" type="slidenum">
               <a:rPr lang="en-US" smtClean="0"/>
+              <a:pPr/>
               <a:t>‹#›</a:t>
             </a:fld>
             <a:endParaRPr lang="en-US"/>
@@ -1238,7 +1248,8 @@
           <a:p>
             <a:fld id="{AF36A4A4-BB8A-44E0-883B-9481513997F2}" type="datetimeFigureOut">
               <a:rPr lang="en-US" smtClean="0"/>
-              <a:t>3/17/2014</a:t>
+              <a:pPr/>
+              <a:t>3/18/2014</a:t>
             </a:fld>
             <a:endParaRPr lang="en-US"/>
           </a:p>
@@ -1280,6 +1291,7 @@
           <a:p>
             <a:fld id="{1529C7C7-3459-47EB-A020-C8C67DC67743}" type="slidenum">
               <a:rPr lang="en-US" smtClean="0"/>
+              <a:pPr/>
               <a:t>‹#›</a:t>
             </a:fld>
             <a:endParaRPr lang="en-US"/>
@@ -1403,7 +1415,8 @@
           <a:p>
             <a:fld id="{AF36A4A4-BB8A-44E0-883B-9481513997F2}" type="datetimeFigureOut">
               <a:rPr lang="en-US" smtClean="0"/>
-              <a:t>3/17/2014</a:t>
+              <a:pPr/>
+              <a:t>3/18/2014</a:t>
             </a:fld>
             <a:endParaRPr lang="en-US"/>
           </a:p>
@@ -1445,6 +1458,7 @@
           <a:p>
             <a:fld id="{1529C7C7-3459-47EB-A020-C8C67DC67743}" type="slidenum">
               <a:rPr lang="en-US" smtClean="0"/>
+              <a:pPr/>
               <a:t>‹#›</a:t>
             </a:fld>
             <a:endParaRPr lang="en-US"/>
@@ -1644,7 +1658,8 @@
           <a:p>
             <a:fld id="{AF36A4A4-BB8A-44E0-883B-9481513997F2}" type="datetimeFigureOut">
               <a:rPr lang="en-US" smtClean="0"/>
-              <a:t>3/17/2014</a:t>
+              <a:pPr/>
+              <a:t>3/18/2014</a:t>
             </a:fld>
             <a:endParaRPr lang="en-US"/>
           </a:p>
@@ -1686,6 +1701,7 @@
           <a:p>
             <a:fld id="{1529C7C7-3459-47EB-A020-C8C67DC67743}" type="slidenum">
               <a:rPr lang="en-US" smtClean="0"/>
+              <a:pPr/>
               <a:t>‹#›</a:t>
             </a:fld>
             <a:endParaRPr lang="en-US"/>
@@ -1927,7 +1943,8 @@
           <a:p>
             <a:fld id="{AF36A4A4-BB8A-44E0-883B-9481513997F2}" type="datetimeFigureOut">
               <a:rPr lang="en-US" smtClean="0"/>
-              <a:t>3/17/2014</a:t>
+              <a:pPr/>
+              <a:t>3/18/2014</a:t>
             </a:fld>
             <a:endParaRPr lang="en-US"/>
           </a:p>
@@ -1969,6 +1986,7 @@
           <a:p>
             <a:fld id="{1529C7C7-3459-47EB-A020-C8C67DC67743}" type="slidenum">
               <a:rPr lang="en-US" smtClean="0"/>
+              <a:pPr/>
               <a:t>‹#›</a:t>
             </a:fld>
             <a:endParaRPr lang="en-US"/>
@@ -2344,7 +2362,8 @@
           <a:p>
             <a:fld id="{AF36A4A4-BB8A-44E0-883B-9481513997F2}" type="datetimeFigureOut">
               <a:rPr lang="en-US" smtClean="0"/>
-              <a:t>3/17/2014</a:t>
+              <a:pPr/>
+              <a:t>3/18/2014</a:t>
             </a:fld>
             <a:endParaRPr lang="en-US"/>
           </a:p>
@@ -2386,6 +2405,7 @@
           <a:p>
             <a:fld id="{1529C7C7-3459-47EB-A020-C8C67DC67743}" type="slidenum">
               <a:rPr lang="en-US" smtClean="0"/>
+              <a:pPr/>
               <a:t>‹#›</a:t>
             </a:fld>
             <a:endParaRPr lang="en-US"/>
@@ -2457,7 +2477,8 @@
           <a:p>
             <a:fld id="{AF36A4A4-BB8A-44E0-883B-9481513997F2}" type="datetimeFigureOut">
               <a:rPr lang="en-US" smtClean="0"/>
-              <a:t>3/17/2014</a:t>
+              <a:pPr/>
+              <a:t>3/18/2014</a:t>
             </a:fld>
             <a:endParaRPr lang="en-US"/>
           </a:p>
@@ -2499,6 +2520,7 @@
           <a:p>
             <a:fld id="{1529C7C7-3459-47EB-A020-C8C67DC67743}" type="slidenum">
               <a:rPr lang="en-US" smtClean="0"/>
+              <a:pPr/>
               <a:t>‹#›</a:t>
             </a:fld>
             <a:endParaRPr lang="en-US"/>
@@ -2547,7 +2569,8 @@
           <a:p>
             <a:fld id="{AF36A4A4-BB8A-44E0-883B-9481513997F2}" type="datetimeFigureOut">
               <a:rPr lang="en-US" smtClean="0"/>
-              <a:t>3/17/2014</a:t>
+              <a:pPr/>
+              <a:t>3/18/2014</a:t>
             </a:fld>
             <a:endParaRPr lang="en-US"/>
           </a:p>
@@ -2589,6 +2612,7 @@
           <a:p>
             <a:fld id="{1529C7C7-3459-47EB-A020-C8C67DC67743}" type="slidenum">
               <a:rPr lang="en-US" smtClean="0"/>
+              <a:pPr/>
               <a:t>‹#›</a:t>
             </a:fld>
             <a:endParaRPr lang="en-US"/>
@@ -2819,7 +2843,8 @@
           <a:p>
             <a:fld id="{AF36A4A4-BB8A-44E0-883B-9481513997F2}" type="datetimeFigureOut">
               <a:rPr lang="en-US" smtClean="0"/>
-              <a:t>3/17/2014</a:t>
+              <a:pPr/>
+              <a:t>3/18/2014</a:t>
             </a:fld>
             <a:endParaRPr lang="en-US"/>
           </a:p>
@@ -2861,6 +2886,7 @@
           <a:p>
             <a:fld id="{1529C7C7-3459-47EB-A020-C8C67DC67743}" type="slidenum">
               <a:rPr lang="en-US" smtClean="0"/>
+              <a:pPr/>
               <a:t>‹#›</a:t>
             </a:fld>
             <a:endParaRPr lang="en-US"/>
@@ -3067,7 +3093,8 @@
           <a:p>
             <a:fld id="{AF36A4A4-BB8A-44E0-883B-9481513997F2}" type="datetimeFigureOut">
               <a:rPr lang="en-US" smtClean="0"/>
-              <a:t>3/17/2014</a:t>
+              <a:pPr/>
+              <a:t>3/18/2014</a:t>
             </a:fld>
             <a:endParaRPr lang="en-US"/>
           </a:p>
@@ -3109,6 +3136,7 @@
           <a:p>
             <a:fld id="{1529C7C7-3459-47EB-A020-C8C67DC67743}" type="slidenum">
               <a:rPr lang="en-US" smtClean="0"/>
+              <a:pPr/>
               <a:t>‹#›</a:t>
             </a:fld>
             <a:endParaRPr lang="en-US"/>
@@ -3275,7 +3303,8 @@
           <a:p>
             <a:fld id="{AF36A4A4-BB8A-44E0-883B-9481513997F2}" type="datetimeFigureOut">
               <a:rPr lang="en-US" smtClean="0"/>
-              <a:t>3/17/2014</a:t>
+              <a:pPr/>
+              <a:t>3/18/2014</a:t>
             </a:fld>
             <a:endParaRPr lang="en-US"/>
           </a:p>
@@ -3353,6 +3382,7 @@
           <a:p>
             <a:fld id="{1529C7C7-3459-47EB-A020-C8C67DC67743}" type="slidenum">
               <a:rPr lang="en-US" smtClean="0"/>
+              <a:pPr/>
               <a:t>‹#›</a:t>
             </a:fld>
             <a:endParaRPr lang="en-US"/>
@@ -3851,14 +3881,7 @@
                 <a:latin typeface="Segoe UI Light" pitchFamily="34" charset="0"/>
                 <a:cs typeface="Segoe UI Light" pitchFamily="34" charset="0"/>
               </a:rPr>
-              <a:t>Bind dat</a:t>
-            </a:r>
-            <a:r>
-              <a:rPr lang="en-US" sz="2800" dirty="0" smtClean="0">
-                <a:latin typeface="Segoe UI Light" pitchFamily="34" charset="0"/>
-                <a:cs typeface="Segoe UI Light" pitchFamily="34" charset="0"/>
-              </a:rPr>
-              <a:t>a to DOM elements during initialization.</a:t>
+              <a:t>Bind data to DOM elements during initialization.</a:t>
             </a:r>
           </a:p>
           <a:p>
@@ -6253,6 +6276,237 @@
 </p:sld>
 </file>
 
+<file path=ppt/slides/slide19.xml><?xml version="1.0" encoding="utf-8"?>
+<p:sld xmlns:a="http://schemas.openxmlformats.org/drawingml/2006/main" xmlns:r="http://schemas.openxmlformats.org/officeDocument/2006/relationships" xmlns:p="http://schemas.openxmlformats.org/presentationml/2006/main">
+  <p:cSld>
+    <p:bg>
+      <p:bgPr>
+        <a:blipFill dpi="0" rotWithShape="1">
+          <a:blip r:embed="rId2">
+            <a:alphaModFix amt="37000"/>
+            <a:lum/>
+          </a:blip>
+          <a:srcRect/>
+          <a:tile tx="0" ty="0" sx="100000" sy="100000" flip="none" algn="tl"/>
+        </a:blipFill>
+        <a:effectLst/>
+      </p:bgPr>
+    </p:bg>
+    <p:spTree>
+      <p:nvGrpSpPr>
+        <p:cNvPr id="1" name=""/>
+        <p:cNvGrpSpPr/>
+        <p:nvPr/>
+      </p:nvGrpSpPr>
+      <p:grpSpPr>
+        <a:xfrm>
+          <a:off x="0" y="0"/>
+          <a:ext cx="0" cy="0"/>
+          <a:chOff x="0" y="0"/>
+          <a:chExt cx="0" cy="0"/>
+        </a:xfrm>
+      </p:grpSpPr>
+      <p:sp>
+        <p:nvSpPr>
+          <p:cNvPr id="2" name="Title 1"/>
+          <p:cNvSpPr>
+            <a:spLocks noGrp="1"/>
+          </p:cNvSpPr>
+          <p:nvPr>
+            <p:ph type="title"/>
+          </p:nvPr>
+        </p:nvSpPr>
+        <p:spPr/>
+        <p:txBody>
+          <a:bodyPr>
+            <a:normAutofit fontScale="90000"/>
+          </a:bodyPr>
+          <a:lstStyle/>
+          <a:p>
+            <a:r>
+              <a:rPr lang="en-US" dirty="0" smtClean="0">
+                <a:latin typeface="Segoe UI Light" pitchFamily="34" charset="0"/>
+                <a:cs typeface="Segoe UI Light" pitchFamily="34" charset="0"/>
+              </a:rPr>
+              <a:t>Learning Program – </a:t>
+            </a:r>
+            <a:r>
+              <a:rPr lang="en-US" dirty="0" smtClean="0">
+                <a:latin typeface="Segoe UI Light" pitchFamily="34" charset="0"/>
+                <a:cs typeface="Segoe UI Light" pitchFamily="34" charset="0"/>
+              </a:rPr>
+              <a:t>Authentication</a:t>
+            </a:r>
+            <a:endParaRPr lang="en-US" dirty="0">
+              <a:latin typeface="Segoe UI Light" pitchFamily="34" charset="0"/>
+              <a:cs typeface="Segoe UI Light" pitchFamily="34" charset="0"/>
+            </a:endParaRPr>
+          </a:p>
+        </p:txBody>
+      </p:sp>
+      <p:sp>
+        <p:nvSpPr>
+          <p:cNvPr id="3" name="Content Placeholder 2"/>
+          <p:cNvSpPr>
+            <a:spLocks noGrp="1"/>
+          </p:cNvSpPr>
+          <p:nvPr>
+            <p:ph idx="1"/>
+          </p:nvPr>
+        </p:nvSpPr>
+        <p:spPr>
+          <a:xfrm>
+            <a:off x="457200" y="1600200"/>
+            <a:ext cx="8534400" cy="4525963"/>
+          </a:xfrm>
+        </p:spPr>
+        <p:txBody>
+          <a:bodyPr>
+            <a:noAutofit/>
+          </a:bodyPr>
+          <a:lstStyle/>
+          <a:p>
+            <a:pPr marL="514350" indent="-514350">
+              <a:buNone/>
+            </a:pPr>
+            <a:r>
+              <a:rPr lang="en-US" sz="2000" dirty="0" smtClean="0">
+                <a:latin typeface="Segoe UI Light" pitchFamily="34" charset="0"/>
+                <a:cs typeface="Segoe UI Light" pitchFamily="34" charset="0"/>
+              </a:rPr>
+              <a:t>Step-6</a:t>
+            </a:r>
+            <a:endParaRPr lang="en-US" sz="2000" dirty="0">
+              <a:latin typeface="Segoe UI Light" pitchFamily="34" charset="0"/>
+              <a:cs typeface="Segoe UI Light" pitchFamily="34" charset="0"/>
+            </a:endParaRPr>
+          </a:p>
+          <a:p>
+            <a:pPr marL="514350" indent="-514350">
+              <a:buNone/>
+            </a:pPr>
+            <a:r>
+              <a:rPr lang="en-US" sz="2000" dirty="0" smtClean="0">
+                <a:latin typeface="Segoe UI Light" pitchFamily="34" charset="0"/>
+                <a:cs typeface="Segoe UI Light" pitchFamily="34" charset="0"/>
+              </a:rPr>
+              <a:t>User authentication</a:t>
+            </a:r>
+            <a:endParaRPr lang="en-US" sz="2000" dirty="0" smtClean="0">
+              <a:latin typeface="Segoe UI Light" pitchFamily="34" charset="0"/>
+              <a:cs typeface="Segoe UI Light" pitchFamily="34" charset="0"/>
+            </a:endParaRPr>
+          </a:p>
+          <a:p>
+            <a:pPr marL="514350" indent="-514350">
+              <a:buNone/>
+            </a:pPr>
+            <a:r>
+              <a:rPr lang="en-US" sz="2000" dirty="0" smtClean="0">
+                <a:latin typeface="Segoe UI Light" pitchFamily="34" charset="0"/>
+                <a:cs typeface="Segoe UI Light" pitchFamily="34" charset="0"/>
+                <a:hlinkClick r:id="rId3"/>
+              </a:rPr>
+              <a:t>http://blog.auth0.com/2014/01/07/angularjs-authentication-with-cookies-vs-token/</a:t>
+            </a:r>
+            <a:endParaRPr lang="en-US" sz="2000" dirty="0" smtClean="0">
+              <a:latin typeface="Segoe UI Light" pitchFamily="34" charset="0"/>
+              <a:cs typeface="Segoe UI Light" pitchFamily="34" charset="0"/>
+            </a:endParaRPr>
+          </a:p>
+          <a:p>
+            <a:pPr marL="514350" indent="-514350">
+              <a:buNone/>
+            </a:pPr>
+            <a:endParaRPr lang="en-US" sz="1050" dirty="0" smtClean="0">
+              <a:latin typeface="Segoe UI Light" pitchFamily="34" charset="0"/>
+              <a:cs typeface="Segoe UI Light" pitchFamily="34" charset="0"/>
+            </a:endParaRPr>
+          </a:p>
+          <a:p>
+            <a:pPr marL="514350" indent="-514350">
+              <a:buNone/>
+            </a:pPr>
+            <a:r>
+              <a:rPr lang="en-US" sz="2400" dirty="0" smtClean="0">
+                <a:latin typeface="Segoe UI Light" pitchFamily="34" charset="0"/>
+                <a:cs typeface="Segoe UI Light" pitchFamily="34" charset="0"/>
+              </a:rPr>
+              <a:t>Create a sample application using the code sample provided in the above example</a:t>
+            </a:r>
+          </a:p>
+          <a:p>
+            <a:pPr marL="514350" indent="-514350">
+              <a:buNone/>
+            </a:pPr>
+            <a:endParaRPr lang="en-US" sz="2400" dirty="0" smtClean="0">
+              <a:latin typeface="Segoe UI Light" pitchFamily="34" charset="0"/>
+              <a:cs typeface="Segoe UI Light" pitchFamily="34" charset="0"/>
+            </a:endParaRPr>
+          </a:p>
+          <a:p>
+            <a:pPr marL="514350" indent="-514350">
+              <a:buNone/>
+            </a:pPr>
+            <a:r>
+              <a:rPr lang="en-US" sz="2400" dirty="0" smtClean="0">
+                <a:latin typeface="Segoe UI Light" pitchFamily="34" charset="0"/>
+                <a:cs typeface="Segoe UI Light" pitchFamily="34" charset="0"/>
+              </a:rPr>
+              <a:t>Modify the existing user management system so that only authenticated users can add, edit and delete users but everyone can view them.</a:t>
+            </a:r>
+            <a:endParaRPr lang="en-US" sz="1050" dirty="0" smtClean="0">
+              <a:latin typeface="Segoe UI Light" pitchFamily="34" charset="0"/>
+              <a:cs typeface="Segoe UI Light" pitchFamily="34" charset="0"/>
+            </a:endParaRPr>
+          </a:p>
+          <a:p>
+            <a:pPr marL="514350" indent="-514350">
+              <a:buNone/>
+            </a:pPr>
+            <a:r>
+              <a:rPr lang="en-US" sz="1050" dirty="0">
+                <a:latin typeface="Segoe UI Light" pitchFamily="34" charset="0"/>
+                <a:cs typeface="Segoe UI Light" pitchFamily="34" charset="0"/>
+              </a:rPr>
+              <a:t>	</a:t>
+            </a:r>
+            <a:endParaRPr lang="en-US" sz="1050" dirty="0" smtClean="0">
+              <a:latin typeface="Segoe UI Light" pitchFamily="34" charset="0"/>
+              <a:cs typeface="Segoe UI Light" pitchFamily="34" charset="0"/>
+            </a:endParaRPr>
+          </a:p>
+          <a:p>
+            <a:pPr marL="514350" indent="-514350">
+              <a:buNone/>
+            </a:pPr>
+            <a:r>
+              <a:rPr lang="en-US" sz="2000" dirty="0">
+                <a:latin typeface="Segoe UI Light" pitchFamily="34" charset="0"/>
+                <a:cs typeface="Segoe UI Light" pitchFamily="34" charset="0"/>
+              </a:rPr>
+              <a:t>	</a:t>
+            </a:r>
+          </a:p>
+          <a:p>
+            <a:pPr marL="514350" indent="-514350">
+              <a:buNone/>
+            </a:pPr>
+            <a:endParaRPr lang="en-US" sz="2000" dirty="0" smtClean="0">
+              <a:latin typeface="Segoe UI Light" pitchFamily="34" charset="0"/>
+              <a:cs typeface="Segoe UI Light" pitchFamily="34" charset="0"/>
+            </a:endParaRPr>
+          </a:p>
+        </p:txBody>
+      </p:sp>
+    </p:spTree>
+  </p:cSld>
+  <p:clrMapOvr>
+    <a:masterClrMapping/>
+  </p:clrMapOvr>
+</p:sld>
+</file>
+
 <file path=ppt/slides/slide2.xml><?xml version="1.0" encoding="utf-8"?>
 <p:sld xmlns:a="http://schemas.openxmlformats.org/drawingml/2006/main" xmlns:r="http://schemas.openxmlformats.org/officeDocument/2006/relationships" xmlns:p="http://schemas.openxmlformats.org/presentationml/2006/main">
   <p:cSld>
@@ -7291,14 +7545,7 @@
                 <a:latin typeface="Consolas" pitchFamily="49" charset="0"/>
                 <a:cs typeface="Consolas" pitchFamily="49" charset="0"/>
               </a:rPr>
-              <a:t>   </a:t>
-            </a:r>
-            <a:r>
-              <a:rPr lang="en-US" sz="1800" dirty="0" smtClean="0">
-                <a:latin typeface="Consolas" pitchFamily="49" charset="0"/>
-                <a:cs typeface="Consolas" pitchFamily="49" charset="0"/>
-              </a:rPr>
-              <a:t>$.</a:t>
+              <a:t>   $.</a:t>
             </a:r>
             <a:r>
               <a:rPr lang="en-US" sz="1800" dirty="0" err="1" smtClean="0">
@@ -7869,10 +8116,6 @@
               </a:rPr>
               <a:t>.</a:t>
             </a:r>
-            <a:endParaRPr lang="en-US" sz="2800" dirty="0" smtClean="0">
-              <a:latin typeface="Segoe UI Light" pitchFamily="34" charset="0"/>
-              <a:cs typeface="Segoe UI Light" pitchFamily="34" charset="0"/>
-            </a:endParaRPr>
           </a:p>
         </p:txBody>
       </p:sp>

</xml_diff>